<commit_message>
added nasa api to find spring and neap tides
</commit_message>
<xml_diff>
--- a/SP3172  Monsoon surges and high tides (.pptx
+++ b/SP3172  Monsoon surges and high tides (.pptx
@@ -7,6 +7,14 @@
   <p:sldIdLst>
     <p:sldId id="256" r:id="rId2"/>
     <p:sldId id="257" r:id="rId3"/>
+    <p:sldId id="258" r:id="rId4"/>
+    <p:sldId id="259" r:id="rId5"/>
+    <p:sldId id="261" r:id="rId6"/>
+    <p:sldId id="263" r:id="rId7"/>
+    <p:sldId id="264" r:id="rId8"/>
+    <p:sldId id="265" r:id="rId9"/>
+    <p:sldId id="266" r:id="rId10"/>
+    <p:sldId id="262" r:id="rId11"/>
   </p:sldIdLst>
   <p:sldSz cx="12192000" cy="6858000"/>
   <p:notesSz cx="6858000" cy="9144000"/>
@@ -105,6 +113,11 @@
       </a:defRPr>
     </a:lvl9pPr>
   </p:defaultTextStyle>
+  <p:extLst>
+    <p:ext uri="{EFAFB233-063F-42B5-8137-9DF3F51BA10A}">
+      <p15:sldGuideLst xmlns:p15="http://schemas.microsoft.com/office/powerpoint/2012/main"/>
+    </p:ext>
+  </p:extLst>
 </p:presentation>
 </file>
 
@@ -257,7 +270,7 @@
           <a:p>
             <a:fld id="{D29A743F-7A00-4F32-8E79-C3D034A4D271}" type="datetimeFigureOut">
               <a:rPr lang="en-IN" smtClean="0"/>
-              <a:t>02-02-2025</a:t>
+              <a:t>09-02-2025</a:t>
             </a:fld>
             <a:endParaRPr lang="en-IN"/>
           </a:p>
@@ -457,7 +470,7 @@
           <a:p>
             <a:fld id="{D29A743F-7A00-4F32-8E79-C3D034A4D271}" type="datetimeFigureOut">
               <a:rPr lang="en-IN" smtClean="0"/>
-              <a:t>02-02-2025</a:t>
+              <a:t>09-02-2025</a:t>
             </a:fld>
             <a:endParaRPr lang="en-IN"/>
           </a:p>
@@ -667,7 +680,7 @@
           <a:p>
             <a:fld id="{D29A743F-7A00-4F32-8E79-C3D034A4D271}" type="datetimeFigureOut">
               <a:rPr lang="en-IN" smtClean="0"/>
-              <a:t>02-02-2025</a:t>
+              <a:t>09-02-2025</a:t>
             </a:fld>
             <a:endParaRPr lang="en-IN"/>
           </a:p>
@@ -867,7 +880,7 @@
           <a:p>
             <a:fld id="{D29A743F-7A00-4F32-8E79-C3D034A4D271}" type="datetimeFigureOut">
               <a:rPr lang="en-IN" smtClean="0"/>
-              <a:t>02-02-2025</a:t>
+              <a:t>09-02-2025</a:t>
             </a:fld>
             <a:endParaRPr lang="en-IN"/>
           </a:p>
@@ -1143,7 +1156,7 @@
           <a:p>
             <a:fld id="{D29A743F-7A00-4F32-8E79-C3D034A4D271}" type="datetimeFigureOut">
               <a:rPr lang="en-IN" smtClean="0"/>
-              <a:t>02-02-2025</a:t>
+              <a:t>09-02-2025</a:t>
             </a:fld>
             <a:endParaRPr lang="en-IN"/>
           </a:p>
@@ -1411,7 +1424,7 @@
           <a:p>
             <a:fld id="{D29A743F-7A00-4F32-8E79-C3D034A4D271}" type="datetimeFigureOut">
               <a:rPr lang="en-IN" smtClean="0"/>
-              <a:t>02-02-2025</a:t>
+              <a:t>09-02-2025</a:t>
             </a:fld>
             <a:endParaRPr lang="en-IN"/>
           </a:p>
@@ -1826,7 +1839,7 @@
           <a:p>
             <a:fld id="{D29A743F-7A00-4F32-8E79-C3D034A4D271}" type="datetimeFigureOut">
               <a:rPr lang="en-IN" smtClean="0"/>
-              <a:t>02-02-2025</a:t>
+              <a:t>09-02-2025</a:t>
             </a:fld>
             <a:endParaRPr lang="en-IN"/>
           </a:p>
@@ -1968,7 +1981,7 @@
           <a:p>
             <a:fld id="{D29A743F-7A00-4F32-8E79-C3D034A4D271}" type="datetimeFigureOut">
               <a:rPr lang="en-IN" smtClean="0"/>
-              <a:t>02-02-2025</a:t>
+              <a:t>09-02-2025</a:t>
             </a:fld>
             <a:endParaRPr lang="en-IN"/>
           </a:p>
@@ -2081,7 +2094,7 @@
           <a:p>
             <a:fld id="{D29A743F-7A00-4F32-8E79-C3D034A4D271}" type="datetimeFigureOut">
               <a:rPr lang="en-IN" smtClean="0"/>
-              <a:t>02-02-2025</a:t>
+              <a:t>09-02-2025</a:t>
             </a:fld>
             <a:endParaRPr lang="en-IN"/>
           </a:p>
@@ -2394,7 +2407,7 @@
           <a:p>
             <a:fld id="{D29A743F-7A00-4F32-8E79-C3D034A4D271}" type="datetimeFigureOut">
               <a:rPr lang="en-IN" smtClean="0"/>
-              <a:t>02-02-2025</a:t>
+              <a:t>09-02-2025</a:t>
             </a:fld>
             <a:endParaRPr lang="en-IN"/>
           </a:p>
@@ -2683,7 +2696,7 @@
           <a:p>
             <a:fld id="{D29A743F-7A00-4F32-8E79-C3D034A4D271}" type="datetimeFigureOut">
               <a:rPr lang="en-IN" smtClean="0"/>
-              <a:t>02-02-2025</a:t>
+              <a:t>09-02-2025</a:t>
             </a:fld>
             <a:endParaRPr lang="en-IN"/>
           </a:p>
@@ -2926,7 +2939,7 @@
           <a:p>
             <a:fld id="{D29A743F-7A00-4F32-8E79-C3D034A4D271}" type="datetimeFigureOut">
               <a:rPr lang="en-IN" smtClean="0"/>
-              <a:t>02-02-2025</a:t>
+              <a:t>09-02-2025</a:t>
             </a:fld>
             <a:endParaRPr lang="en-IN"/>
           </a:p>
@@ -3428,6 +3441,99 @@
 </p:sld>
 </file>
 
+<file path=ppt/slides/slide10.xml><?xml version="1.0" encoding="utf-8"?>
+<p:sld xmlns:a="http://schemas.openxmlformats.org/drawingml/2006/main" xmlns:r="http://schemas.openxmlformats.org/officeDocument/2006/relationships" xmlns:p="http://schemas.openxmlformats.org/presentationml/2006/main">
+  <p:cSld>
+    <p:spTree>
+      <p:nvGrpSpPr>
+        <p:cNvPr id="1" name=""/>
+        <p:cNvGrpSpPr/>
+        <p:nvPr/>
+      </p:nvGrpSpPr>
+      <p:grpSpPr>
+        <a:xfrm>
+          <a:off x="0" y="0"/>
+          <a:ext cx="0" cy="0"/>
+          <a:chOff x="0" y="0"/>
+          <a:chExt cx="0" cy="0"/>
+        </a:xfrm>
+      </p:grpSpPr>
+      <p:sp>
+        <p:nvSpPr>
+          <p:cNvPr id="2" name="Title 1">
+            <a:extLst>
+              <a:ext uri="{FF2B5EF4-FFF2-40B4-BE49-F238E27FC236}">
+                <a16:creationId xmlns:a16="http://schemas.microsoft.com/office/drawing/2014/main" id="{18D67BE7-B3D4-A094-86F9-86F8E7F71940}"/>
+              </a:ext>
+            </a:extLst>
+          </p:cNvPr>
+          <p:cNvSpPr>
+            <a:spLocks noGrp="1"/>
+          </p:cNvSpPr>
+          <p:nvPr>
+            <p:ph type="title"/>
+          </p:nvPr>
+        </p:nvSpPr>
+        <p:spPr/>
+        <p:txBody>
+          <a:bodyPr/>
+          <a:lstStyle/>
+          <a:p>
+            <a:r>
+              <a:rPr lang="en-US" dirty="0"/>
+              <a:t>How is it helpful? (whether in fundamental research or in applications of it in Singapore)</a:t>
+            </a:r>
+            <a:endParaRPr lang="en-IN" dirty="0"/>
+          </a:p>
+        </p:txBody>
+      </p:sp>
+      <p:sp>
+        <p:nvSpPr>
+          <p:cNvPr id="3" name="Content Placeholder 2">
+            <a:extLst>
+              <a:ext uri="{FF2B5EF4-FFF2-40B4-BE49-F238E27FC236}">
+                <a16:creationId xmlns:a16="http://schemas.microsoft.com/office/drawing/2014/main" id="{DB362883-B866-A6EB-0039-580DBFC94F28}"/>
+              </a:ext>
+            </a:extLst>
+          </p:cNvPr>
+          <p:cNvSpPr>
+            <a:spLocks noGrp="1"/>
+          </p:cNvSpPr>
+          <p:nvPr>
+            <p:ph idx="1"/>
+          </p:nvPr>
+        </p:nvSpPr>
+        <p:spPr/>
+        <p:txBody>
+          <a:bodyPr/>
+          <a:lstStyle/>
+          <a:p>
+            <a:r>
+              <a:rPr lang="en-US" dirty="0"/>
+              <a:t>Primarily helpful in applications across Malaysia and Singapore </a:t>
+            </a:r>
+          </a:p>
+          <a:p>
+            <a:r>
+              <a:rPr lang="en-US" dirty="0"/>
+              <a:t>Can be extended over the remaining portion of the Maritime Continent</a:t>
+            </a:r>
+          </a:p>
+        </p:txBody>
+      </p:sp>
+    </p:spTree>
+    <p:extLst>
+      <p:ext uri="{BB962C8B-B14F-4D97-AF65-F5344CB8AC3E}">
+        <p14:creationId xmlns:p14="http://schemas.microsoft.com/office/powerpoint/2010/main" val="2616415129"/>
+      </p:ext>
+    </p:extLst>
+  </p:cSld>
+  <p:clrMapOvr>
+    <a:masterClrMapping/>
+  </p:clrMapOvr>
+</p:sld>
+</file>
+
 <file path=ppt/slides/slide2.xml><?xml version="1.0" encoding="utf-8"?>
 <p:sld xmlns:a="http://schemas.openxmlformats.org/drawingml/2006/main" xmlns:r="http://schemas.openxmlformats.org/officeDocument/2006/relationships" xmlns:p="http://schemas.openxmlformats.org/presentationml/2006/main">
   <p:cSld>
@@ -3499,7 +3605,28 @@
           <a:bodyPr/>
           <a:lstStyle/>
           <a:p>
-            <a:endParaRPr lang="en-IN"/>
+            <a:r>
+              <a:rPr lang="en-US" dirty="0"/>
+              <a:t>Why is this research important? </a:t>
+            </a:r>
+          </a:p>
+          <a:p>
+            <a:r>
+              <a:rPr lang="en-US" dirty="0"/>
+              <a:t>What does it aim to do/find? </a:t>
+            </a:r>
+          </a:p>
+          <a:p>
+            <a:r>
+              <a:rPr lang="en-US" dirty="0"/>
+              <a:t>What is the progress so far? </a:t>
+            </a:r>
+          </a:p>
+          <a:p>
+            <a:r>
+              <a:rPr lang="en-US" dirty="0"/>
+              <a:t>How is it helpful? </a:t>
+            </a:r>
           </a:p>
         </p:txBody>
       </p:sp>
@@ -3507,6 +3634,716 @@
     <p:extLst>
       <p:ext uri="{BB962C8B-B14F-4D97-AF65-F5344CB8AC3E}">
         <p14:creationId xmlns:p14="http://schemas.microsoft.com/office/powerpoint/2010/main" val="3471289143"/>
+      </p:ext>
+    </p:extLst>
+  </p:cSld>
+  <p:clrMapOvr>
+    <a:masterClrMapping/>
+  </p:clrMapOvr>
+</p:sld>
+</file>
+
+<file path=ppt/slides/slide3.xml><?xml version="1.0" encoding="utf-8"?>
+<p:sld xmlns:a="http://schemas.openxmlformats.org/drawingml/2006/main" xmlns:r="http://schemas.openxmlformats.org/officeDocument/2006/relationships" xmlns:p="http://schemas.openxmlformats.org/presentationml/2006/main">
+  <p:cSld>
+    <p:spTree>
+      <p:nvGrpSpPr>
+        <p:cNvPr id="1" name=""/>
+        <p:cNvGrpSpPr/>
+        <p:nvPr/>
+      </p:nvGrpSpPr>
+      <p:grpSpPr>
+        <a:xfrm>
+          <a:off x="0" y="0"/>
+          <a:ext cx="0" cy="0"/>
+          <a:chOff x="0" y="0"/>
+          <a:chExt cx="0" cy="0"/>
+        </a:xfrm>
+      </p:grpSpPr>
+      <p:sp>
+        <p:nvSpPr>
+          <p:cNvPr id="2" name="Title 1">
+            <a:extLst>
+              <a:ext uri="{FF2B5EF4-FFF2-40B4-BE49-F238E27FC236}">
+                <a16:creationId xmlns:a16="http://schemas.microsoft.com/office/drawing/2014/main" id="{F633EDE1-B8C8-7124-8E9C-3943930CE309}"/>
+              </a:ext>
+            </a:extLst>
+          </p:cNvPr>
+          <p:cNvSpPr>
+            <a:spLocks noGrp="1"/>
+          </p:cNvSpPr>
+          <p:nvPr>
+            <p:ph type="title"/>
+          </p:nvPr>
+        </p:nvSpPr>
+        <p:spPr/>
+        <p:txBody>
+          <a:bodyPr/>
+          <a:lstStyle/>
+          <a:p>
+            <a:r>
+              <a:rPr lang="en-US" dirty="0"/>
+              <a:t>What am I doing? </a:t>
+            </a:r>
+            <a:endParaRPr lang="en-IN" dirty="0"/>
+          </a:p>
+        </p:txBody>
+      </p:sp>
+      <p:sp>
+        <p:nvSpPr>
+          <p:cNvPr id="3" name="Content Placeholder 2">
+            <a:extLst>
+              <a:ext uri="{FF2B5EF4-FFF2-40B4-BE49-F238E27FC236}">
+                <a16:creationId xmlns:a16="http://schemas.microsoft.com/office/drawing/2014/main" id="{6472A9C0-3664-7FB7-4F0F-ABAD6F899150}"/>
+              </a:ext>
+            </a:extLst>
+          </p:cNvPr>
+          <p:cNvSpPr>
+            <a:spLocks noGrp="1"/>
+          </p:cNvSpPr>
+          <p:nvPr>
+            <p:ph idx="1"/>
+          </p:nvPr>
+        </p:nvSpPr>
+        <p:spPr/>
+        <p:txBody>
+          <a:bodyPr>
+            <a:normAutofit fontScale="85000" lnSpcReduction="20000"/>
+          </a:bodyPr>
+          <a:lstStyle/>
+          <a:p>
+            <a:r>
+              <a:rPr lang="en-US" dirty="0"/>
+              <a:t>Studying tide levels around the Malaysian Peninsula (as a subset of the Maritime Continent) to find their relation to monsoon surge events in this region</a:t>
+            </a:r>
+          </a:p>
+          <a:p>
+            <a:pPr lvl="1"/>
+            <a:r>
+              <a:rPr lang="en-IN" dirty="0"/>
+              <a:t>Also explain specifically why these 6 gauges (Koh et. al (2024)) </a:t>
+            </a:r>
+          </a:p>
+          <a:p>
+            <a:pPr lvl="1"/>
+            <a:r>
+              <a:rPr lang="en-IN" dirty="0"/>
+              <a:t>Moreover, they lie at the ‘receiving’ end of the Malaysian coast with regards to the NE monsoon</a:t>
+            </a:r>
+          </a:p>
+          <a:p>
+            <a:r>
+              <a:rPr lang="en-IN" dirty="0"/>
+              <a:t>The relation between low pressure areas, high wind speeds and high tide levels has always been surmised around the monsoon surge events – but what separates surge events from other instances of monsoon/instances of high rainfall? This has not been </a:t>
+            </a:r>
+            <a:r>
+              <a:rPr lang="en-IN" b="1" dirty="0"/>
+              <a:t>numerically shown/proved</a:t>
+            </a:r>
+            <a:r>
+              <a:rPr lang="en-IN" dirty="0"/>
+              <a:t>. </a:t>
+            </a:r>
+          </a:p>
+          <a:p>
+            <a:r>
+              <a:rPr lang="en-IN" dirty="0"/>
+              <a:t>Moreover their relation with surrounding large scale events (MJO, Indian Ocean dipole, El Nino/La Nina) has not been </a:t>
+            </a:r>
+            <a:r>
+              <a:rPr lang="en-IN" b="1" dirty="0"/>
+              <a:t>numerically studied </a:t>
+            </a:r>
+            <a:r>
+              <a:rPr lang="en-IN" dirty="0"/>
+              <a:t>either. </a:t>
+            </a:r>
+          </a:p>
+          <a:p>
+            <a:r>
+              <a:rPr lang="en-IN" dirty="0"/>
+              <a:t>Not only study the relation, but possibly develop a model (either statistical) or a grid-specific simulation taking into account the existing data, and develop predictions of the occurrence and magnitude (?) of such events </a:t>
+            </a:r>
+          </a:p>
+        </p:txBody>
+      </p:sp>
+    </p:spTree>
+    <p:extLst>
+      <p:ext uri="{BB962C8B-B14F-4D97-AF65-F5344CB8AC3E}">
+        <p14:creationId xmlns:p14="http://schemas.microsoft.com/office/powerpoint/2010/main" val="3076026959"/>
+      </p:ext>
+    </p:extLst>
+  </p:cSld>
+  <p:clrMapOvr>
+    <a:masterClrMapping/>
+  </p:clrMapOvr>
+</p:sld>
+</file>
+
+<file path=ppt/slides/slide4.xml><?xml version="1.0" encoding="utf-8"?>
+<p:sld xmlns:a="http://schemas.openxmlformats.org/drawingml/2006/main" xmlns:r="http://schemas.openxmlformats.org/officeDocument/2006/relationships" xmlns:p="http://schemas.openxmlformats.org/presentationml/2006/main">
+  <p:cSld>
+    <p:spTree>
+      <p:nvGrpSpPr>
+        <p:cNvPr id="1" name=""/>
+        <p:cNvGrpSpPr/>
+        <p:nvPr/>
+      </p:nvGrpSpPr>
+      <p:grpSpPr>
+        <a:xfrm>
+          <a:off x="0" y="0"/>
+          <a:ext cx="0" cy="0"/>
+          <a:chOff x="0" y="0"/>
+          <a:chExt cx="0" cy="0"/>
+        </a:xfrm>
+      </p:grpSpPr>
+      <p:sp>
+        <p:nvSpPr>
+          <p:cNvPr id="2" name="Title 1">
+            <a:extLst>
+              <a:ext uri="{FF2B5EF4-FFF2-40B4-BE49-F238E27FC236}">
+                <a16:creationId xmlns:a16="http://schemas.microsoft.com/office/drawing/2014/main" id="{D0708689-1857-0474-A3A1-6E1AB43868AA}"/>
+              </a:ext>
+            </a:extLst>
+          </p:cNvPr>
+          <p:cNvSpPr>
+            <a:spLocks noGrp="1"/>
+          </p:cNvSpPr>
+          <p:nvPr>
+            <p:ph type="title"/>
+          </p:nvPr>
+        </p:nvSpPr>
+        <p:spPr/>
+        <p:txBody>
+          <a:bodyPr/>
+          <a:lstStyle/>
+          <a:p>
+            <a:r>
+              <a:rPr lang="en-US" dirty="0"/>
+              <a:t>Why am I doing this? </a:t>
+            </a:r>
+            <a:endParaRPr lang="en-IN" dirty="0"/>
+          </a:p>
+        </p:txBody>
+      </p:sp>
+      <p:sp>
+        <p:nvSpPr>
+          <p:cNvPr id="3" name="Content Placeholder 2">
+            <a:extLst>
+              <a:ext uri="{FF2B5EF4-FFF2-40B4-BE49-F238E27FC236}">
+                <a16:creationId xmlns:a16="http://schemas.microsoft.com/office/drawing/2014/main" id="{FDB4E236-9A78-BE9F-331B-722539886868}"/>
+              </a:ext>
+            </a:extLst>
+          </p:cNvPr>
+          <p:cNvSpPr>
+            <a:spLocks noGrp="1"/>
+          </p:cNvSpPr>
+          <p:nvPr>
+            <p:ph idx="1"/>
+          </p:nvPr>
+        </p:nvSpPr>
+        <p:spPr/>
+        <p:txBody>
+          <a:bodyPr/>
+          <a:lstStyle/>
+          <a:p>
+            <a:r>
+              <a:rPr lang="en-IN" dirty="0"/>
+              <a:t>Improves predictability of surge events and associated flash floods </a:t>
+            </a:r>
+            <a:r>
+              <a:rPr lang="en-IN" dirty="0">
+                <a:sym typeface="Wingdings" panose="05000000000000000000" pitchFamily="2" charset="2"/>
+              </a:rPr>
+              <a:t> especially helpful for NEA to coordinate government efforts to evacuate citizens from affected areas, and make prior necessary arrangements for the safety of Singaporeans, Malaysians, and tourists in the region </a:t>
+            </a:r>
+            <a:endParaRPr lang="en-US" dirty="0">
+              <a:sym typeface="Wingdings" panose="05000000000000000000" pitchFamily="2" charset="2"/>
+            </a:endParaRPr>
+          </a:p>
+          <a:p>
+            <a:r>
+              <a:rPr lang="en-US" dirty="0">
+                <a:sym typeface="Wingdings" panose="05000000000000000000" pitchFamily="2" charset="2"/>
+              </a:rPr>
+              <a:t>&lt;insert ST image of flash floods in Pulau Ubin&gt; </a:t>
+            </a:r>
+            <a:endParaRPr lang="en-IN" dirty="0"/>
+          </a:p>
+        </p:txBody>
+      </p:sp>
+    </p:spTree>
+    <p:extLst>
+      <p:ext uri="{BB962C8B-B14F-4D97-AF65-F5344CB8AC3E}">
+        <p14:creationId xmlns:p14="http://schemas.microsoft.com/office/powerpoint/2010/main" val="165331165"/>
+      </p:ext>
+    </p:extLst>
+  </p:cSld>
+  <p:clrMapOvr>
+    <a:masterClrMapping/>
+  </p:clrMapOvr>
+</p:sld>
+</file>
+
+<file path=ppt/slides/slide5.xml><?xml version="1.0" encoding="utf-8"?>
+<p:sld xmlns:a="http://schemas.openxmlformats.org/drawingml/2006/main" xmlns:r="http://schemas.openxmlformats.org/officeDocument/2006/relationships" xmlns:p="http://schemas.openxmlformats.org/presentationml/2006/main">
+  <p:cSld>
+    <p:spTree>
+      <p:nvGrpSpPr>
+        <p:cNvPr id="1" name=""/>
+        <p:cNvGrpSpPr/>
+        <p:nvPr/>
+      </p:nvGrpSpPr>
+      <p:grpSpPr>
+        <a:xfrm>
+          <a:off x="0" y="0"/>
+          <a:ext cx="0" cy="0"/>
+          <a:chOff x="0" y="0"/>
+          <a:chExt cx="0" cy="0"/>
+        </a:xfrm>
+      </p:grpSpPr>
+      <p:sp>
+        <p:nvSpPr>
+          <p:cNvPr id="2" name="Title 1">
+            <a:extLst>
+              <a:ext uri="{FF2B5EF4-FFF2-40B4-BE49-F238E27FC236}">
+                <a16:creationId xmlns:a16="http://schemas.microsoft.com/office/drawing/2014/main" id="{E7D1B295-FF87-2EE5-8EEC-0A7C50DA32E3}"/>
+              </a:ext>
+            </a:extLst>
+          </p:cNvPr>
+          <p:cNvSpPr>
+            <a:spLocks noGrp="1"/>
+          </p:cNvSpPr>
+          <p:nvPr>
+            <p:ph type="title"/>
+          </p:nvPr>
+        </p:nvSpPr>
+        <p:spPr/>
+        <p:txBody>
+          <a:bodyPr/>
+          <a:lstStyle/>
+          <a:p>
+            <a:r>
+              <a:rPr lang="en-US" dirty="0"/>
+              <a:t>What has been my progress with this? </a:t>
+            </a:r>
+            <a:endParaRPr lang="en-IN" dirty="0"/>
+          </a:p>
+        </p:txBody>
+      </p:sp>
+      <p:sp>
+        <p:nvSpPr>
+          <p:cNvPr id="3" name="Content Placeholder 2">
+            <a:extLst>
+              <a:ext uri="{FF2B5EF4-FFF2-40B4-BE49-F238E27FC236}">
+                <a16:creationId xmlns:a16="http://schemas.microsoft.com/office/drawing/2014/main" id="{AE012085-041A-B94A-94FA-A4D6B14EAD5F}"/>
+              </a:ext>
+            </a:extLst>
+          </p:cNvPr>
+          <p:cNvSpPr>
+            <a:spLocks noGrp="1"/>
+          </p:cNvSpPr>
+          <p:nvPr>
+            <p:ph idx="1"/>
+          </p:nvPr>
+        </p:nvSpPr>
+        <p:spPr/>
+        <p:txBody>
+          <a:bodyPr/>
+          <a:lstStyle/>
+          <a:p>
+            <a:r>
+              <a:rPr lang="en-US" dirty="0"/>
+              <a:t>Data cleaning </a:t>
+            </a:r>
+            <a:r>
+              <a:rPr lang="en-US" dirty="0">
+                <a:sym typeface="Wingdings" panose="05000000000000000000" pitchFamily="2" charset="2"/>
+              </a:rPr>
+              <a:t> instrumental/observational errors  cleaning those out to get cleaner time series graphs </a:t>
+            </a:r>
+          </a:p>
+          <a:p>
+            <a:pPr lvl="1"/>
+            <a:r>
+              <a:rPr lang="en-US" dirty="0">
+                <a:sym typeface="Wingdings" panose="05000000000000000000" pitchFamily="2" charset="2"/>
+              </a:rPr>
+              <a:t>Also explain what does ‘cleaned’ mean in this case </a:t>
+            </a:r>
+          </a:p>
+          <a:p>
+            <a:r>
+              <a:rPr lang="en-US" dirty="0">
+                <a:sym typeface="Wingdings" panose="05000000000000000000" pitchFamily="2" charset="2"/>
+              </a:rPr>
+              <a:t>Cleaned data allows me to remove outliers of odd daily maximum tides  allows me to study diurnal and hourly ranges better to spot sea level anomalies numerically and then visually </a:t>
+            </a:r>
+          </a:p>
+          <a:p>
+            <a:r>
+              <a:rPr lang="en-US" dirty="0">
+                <a:sym typeface="Wingdings" panose="05000000000000000000" pitchFamily="2" charset="2"/>
+              </a:rPr>
+              <a:t>Classify ‘high tides’  find the overlap between surge days and the days that have been classified as high tides </a:t>
+            </a:r>
+          </a:p>
+          <a:p>
+            <a:r>
+              <a:rPr lang="en-US" dirty="0">
+                <a:sym typeface="Wingdings" panose="05000000000000000000" pitchFamily="2" charset="2"/>
+              </a:rPr>
+              <a:t>Classify different types of tides and hence find the overlap</a:t>
+            </a:r>
+          </a:p>
+        </p:txBody>
+      </p:sp>
+    </p:spTree>
+    <p:extLst>
+      <p:ext uri="{BB962C8B-B14F-4D97-AF65-F5344CB8AC3E}">
+        <p14:creationId xmlns:p14="http://schemas.microsoft.com/office/powerpoint/2010/main" val="3725654159"/>
+      </p:ext>
+    </p:extLst>
+  </p:cSld>
+  <p:clrMapOvr>
+    <a:masterClrMapping/>
+  </p:clrMapOvr>
+</p:sld>
+</file>
+
+<file path=ppt/slides/slide6.xml><?xml version="1.0" encoding="utf-8"?>
+<p:sld xmlns:a="http://schemas.openxmlformats.org/drawingml/2006/main" xmlns:r="http://schemas.openxmlformats.org/officeDocument/2006/relationships" xmlns:p="http://schemas.openxmlformats.org/presentationml/2006/main">
+  <p:cSld>
+    <p:spTree>
+      <p:nvGrpSpPr>
+        <p:cNvPr id="1" name=""/>
+        <p:cNvGrpSpPr/>
+        <p:nvPr/>
+      </p:nvGrpSpPr>
+      <p:grpSpPr>
+        <a:xfrm>
+          <a:off x="0" y="0"/>
+          <a:ext cx="0" cy="0"/>
+          <a:chOff x="0" y="0"/>
+          <a:chExt cx="0" cy="0"/>
+        </a:xfrm>
+      </p:grpSpPr>
+      <p:sp>
+        <p:nvSpPr>
+          <p:cNvPr id="2" name="Title 1">
+            <a:extLst>
+              <a:ext uri="{FF2B5EF4-FFF2-40B4-BE49-F238E27FC236}">
+                <a16:creationId xmlns:a16="http://schemas.microsoft.com/office/drawing/2014/main" id="{72B603CE-9845-1D69-2E99-28E6005B17EB}"/>
+              </a:ext>
+            </a:extLst>
+          </p:cNvPr>
+          <p:cNvSpPr>
+            <a:spLocks noGrp="1"/>
+          </p:cNvSpPr>
+          <p:nvPr>
+            <p:ph type="title"/>
+          </p:nvPr>
+        </p:nvSpPr>
+        <p:spPr/>
+        <p:txBody>
+          <a:bodyPr/>
+          <a:lstStyle/>
+          <a:p>
+            <a:r>
+              <a:rPr lang="en-US" dirty="0"/>
+              <a:t>&lt;Cleaned time series graphs&gt;</a:t>
+            </a:r>
+            <a:endParaRPr lang="en-IN" dirty="0"/>
+          </a:p>
+        </p:txBody>
+      </p:sp>
+      <p:sp>
+        <p:nvSpPr>
+          <p:cNvPr id="3" name="Content Placeholder 2">
+            <a:extLst>
+              <a:ext uri="{FF2B5EF4-FFF2-40B4-BE49-F238E27FC236}">
+                <a16:creationId xmlns:a16="http://schemas.microsoft.com/office/drawing/2014/main" id="{0EB23B96-85F5-9291-C6AF-6BF9545C1D0E}"/>
+              </a:ext>
+            </a:extLst>
+          </p:cNvPr>
+          <p:cNvSpPr>
+            <a:spLocks noGrp="1"/>
+          </p:cNvSpPr>
+          <p:nvPr>
+            <p:ph idx="1"/>
+          </p:nvPr>
+        </p:nvSpPr>
+        <p:spPr/>
+        <p:txBody>
+          <a:bodyPr/>
+          <a:lstStyle/>
+          <a:p>
+            <a:endParaRPr lang="en-IN"/>
+          </a:p>
+        </p:txBody>
+      </p:sp>
+    </p:spTree>
+    <p:extLst>
+      <p:ext uri="{BB962C8B-B14F-4D97-AF65-F5344CB8AC3E}">
+        <p14:creationId xmlns:p14="http://schemas.microsoft.com/office/powerpoint/2010/main" val="3997489781"/>
+      </p:ext>
+    </p:extLst>
+  </p:cSld>
+  <p:clrMapOvr>
+    <a:masterClrMapping/>
+  </p:clrMapOvr>
+</p:sld>
+</file>
+
+<file path=ppt/slides/slide7.xml><?xml version="1.0" encoding="utf-8"?>
+<p:sld xmlns:a="http://schemas.openxmlformats.org/drawingml/2006/main" xmlns:r="http://schemas.openxmlformats.org/officeDocument/2006/relationships" xmlns:p="http://schemas.openxmlformats.org/presentationml/2006/main">
+  <p:cSld>
+    <p:spTree>
+      <p:nvGrpSpPr>
+        <p:cNvPr id="1" name=""/>
+        <p:cNvGrpSpPr/>
+        <p:nvPr/>
+      </p:nvGrpSpPr>
+      <p:grpSpPr>
+        <a:xfrm>
+          <a:off x="0" y="0"/>
+          <a:ext cx="0" cy="0"/>
+          <a:chOff x="0" y="0"/>
+          <a:chExt cx="0" cy="0"/>
+        </a:xfrm>
+      </p:grpSpPr>
+      <p:sp>
+        <p:nvSpPr>
+          <p:cNvPr id="2" name="Title 1">
+            <a:extLst>
+              <a:ext uri="{FF2B5EF4-FFF2-40B4-BE49-F238E27FC236}">
+                <a16:creationId xmlns:a16="http://schemas.microsoft.com/office/drawing/2014/main" id="{0C0F7411-09A4-660F-6EA0-BA2F8C9669A4}"/>
+              </a:ext>
+            </a:extLst>
+          </p:cNvPr>
+          <p:cNvSpPr>
+            <a:spLocks noGrp="1"/>
+          </p:cNvSpPr>
+          <p:nvPr>
+            <p:ph type="title"/>
+          </p:nvPr>
+        </p:nvSpPr>
+        <p:spPr/>
+        <p:txBody>
+          <a:bodyPr/>
+          <a:lstStyle/>
+          <a:p>
+            <a:r>
+              <a:rPr lang="en-US" dirty="0"/>
+              <a:t>&lt;Venn diagrams of overlaps&gt;</a:t>
+            </a:r>
+            <a:endParaRPr lang="en-IN" dirty="0"/>
+          </a:p>
+        </p:txBody>
+      </p:sp>
+      <p:sp>
+        <p:nvSpPr>
+          <p:cNvPr id="3" name="Content Placeholder 2">
+            <a:extLst>
+              <a:ext uri="{FF2B5EF4-FFF2-40B4-BE49-F238E27FC236}">
+                <a16:creationId xmlns:a16="http://schemas.microsoft.com/office/drawing/2014/main" id="{E65697F6-30B9-C962-4458-B5CCB1350F5D}"/>
+              </a:ext>
+            </a:extLst>
+          </p:cNvPr>
+          <p:cNvSpPr>
+            <a:spLocks noGrp="1"/>
+          </p:cNvSpPr>
+          <p:nvPr>
+            <p:ph idx="1"/>
+          </p:nvPr>
+        </p:nvSpPr>
+        <p:spPr/>
+        <p:txBody>
+          <a:bodyPr/>
+          <a:lstStyle/>
+          <a:p>
+            <a:endParaRPr lang="en-IN"/>
+          </a:p>
+        </p:txBody>
+      </p:sp>
+    </p:spTree>
+    <p:extLst>
+      <p:ext uri="{BB962C8B-B14F-4D97-AF65-F5344CB8AC3E}">
+        <p14:creationId xmlns:p14="http://schemas.microsoft.com/office/powerpoint/2010/main" val="3655099436"/>
+      </p:ext>
+    </p:extLst>
+  </p:cSld>
+  <p:clrMapOvr>
+    <a:masterClrMapping/>
+  </p:clrMapOvr>
+</p:sld>
+</file>
+
+<file path=ppt/slides/slide8.xml><?xml version="1.0" encoding="utf-8"?>
+<p:sld xmlns:a="http://schemas.openxmlformats.org/drawingml/2006/main" xmlns:r="http://schemas.openxmlformats.org/officeDocument/2006/relationships" xmlns:p="http://schemas.openxmlformats.org/presentationml/2006/main">
+  <p:cSld>
+    <p:spTree>
+      <p:nvGrpSpPr>
+        <p:cNvPr id="1" name=""/>
+        <p:cNvGrpSpPr/>
+        <p:nvPr/>
+      </p:nvGrpSpPr>
+      <p:grpSpPr>
+        <a:xfrm>
+          <a:off x="0" y="0"/>
+          <a:ext cx="0" cy="0"/>
+          <a:chOff x="0" y="0"/>
+          <a:chExt cx="0" cy="0"/>
+        </a:xfrm>
+      </p:grpSpPr>
+      <p:sp>
+        <p:nvSpPr>
+          <p:cNvPr id="2" name="Title 1">
+            <a:extLst>
+              <a:ext uri="{FF2B5EF4-FFF2-40B4-BE49-F238E27FC236}">
+                <a16:creationId xmlns:a16="http://schemas.microsoft.com/office/drawing/2014/main" id="{545003F3-F9A6-0475-4520-002DF2B7E391}"/>
+              </a:ext>
+            </a:extLst>
+          </p:cNvPr>
+          <p:cNvSpPr>
+            <a:spLocks noGrp="1"/>
+          </p:cNvSpPr>
+          <p:nvPr>
+            <p:ph type="title"/>
+          </p:nvPr>
+        </p:nvSpPr>
+        <p:spPr/>
+        <p:txBody>
+          <a:bodyPr/>
+          <a:lstStyle/>
+          <a:p>
+            <a:r>
+              <a:rPr lang="en-US" dirty="0"/>
+              <a:t>&lt;Maps showing a visual distribution of high tides&gt;</a:t>
+            </a:r>
+            <a:endParaRPr lang="en-IN" dirty="0"/>
+          </a:p>
+        </p:txBody>
+      </p:sp>
+      <p:sp>
+        <p:nvSpPr>
+          <p:cNvPr id="3" name="Content Placeholder 2">
+            <a:extLst>
+              <a:ext uri="{FF2B5EF4-FFF2-40B4-BE49-F238E27FC236}">
+                <a16:creationId xmlns:a16="http://schemas.microsoft.com/office/drawing/2014/main" id="{3AF199F9-9E4F-AB23-7AC5-9ED620CDBDE7}"/>
+              </a:ext>
+            </a:extLst>
+          </p:cNvPr>
+          <p:cNvSpPr>
+            <a:spLocks noGrp="1"/>
+          </p:cNvSpPr>
+          <p:nvPr>
+            <p:ph idx="1"/>
+          </p:nvPr>
+        </p:nvSpPr>
+        <p:spPr/>
+        <p:txBody>
+          <a:bodyPr/>
+          <a:lstStyle/>
+          <a:p>
+            <a:endParaRPr lang="en-IN"/>
+          </a:p>
+        </p:txBody>
+      </p:sp>
+    </p:spTree>
+    <p:extLst>
+      <p:ext uri="{BB962C8B-B14F-4D97-AF65-F5344CB8AC3E}">
+        <p14:creationId xmlns:p14="http://schemas.microsoft.com/office/powerpoint/2010/main" val="3237274702"/>
+      </p:ext>
+    </p:extLst>
+  </p:cSld>
+  <p:clrMapOvr>
+    <a:masterClrMapping/>
+  </p:clrMapOvr>
+</p:sld>
+</file>
+
+<file path=ppt/slides/slide9.xml><?xml version="1.0" encoding="utf-8"?>
+<p:sld xmlns:a="http://schemas.openxmlformats.org/drawingml/2006/main" xmlns:r="http://schemas.openxmlformats.org/officeDocument/2006/relationships" xmlns:p="http://schemas.openxmlformats.org/presentationml/2006/main">
+  <p:cSld>
+    <p:spTree>
+      <p:nvGrpSpPr>
+        <p:cNvPr id="1" name="">
+          <a:extLst>
+            <a:ext uri="{FF2B5EF4-FFF2-40B4-BE49-F238E27FC236}">
+              <a16:creationId xmlns:a16="http://schemas.microsoft.com/office/drawing/2014/main" id="{13E2A890-FDCB-AAC9-FD3A-BCA9F5B85FCD}"/>
+            </a:ext>
+          </a:extLst>
+        </p:cNvPr>
+        <p:cNvGrpSpPr/>
+        <p:nvPr/>
+      </p:nvGrpSpPr>
+      <p:grpSpPr>
+        <a:xfrm>
+          <a:off x="0" y="0"/>
+          <a:ext cx="0" cy="0"/>
+          <a:chOff x="0" y="0"/>
+          <a:chExt cx="0" cy="0"/>
+        </a:xfrm>
+      </p:grpSpPr>
+      <p:sp>
+        <p:nvSpPr>
+          <p:cNvPr id="2" name="Title 1">
+            <a:extLst>
+              <a:ext uri="{FF2B5EF4-FFF2-40B4-BE49-F238E27FC236}">
+                <a16:creationId xmlns:a16="http://schemas.microsoft.com/office/drawing/2014/main" id="{4CBC08CC-92B0-70A6-2A7D-3F65EC72CE80}"/>
+              </a:ext>
+            </a:extLst>
+          </p:cNvPr>
+          <p:cNvSpPr>
+            <a:spLocks noGrp="1"/>
+          </p:cNvSpPr>
+          <p:nvPr>
+            <p:ph type="title"/>
+          </p:nvPr>
+        </p:nvSpPr>
+        <p:spPr/>
+        <p:txBody>
+          <a:bodyPr/>
+          <a:lstStyle/>
+          <a:p>
+            <a:r>
+              <a:rPr lang="en-US" dirty="0"/>
+              <a:t>&lt;Maps showing a visual distribution of high tides&gt;</a:t>
+            </a:r>
+            <a:endParaRPr lang="en-IN" dirty="0"/>
+          </a:p>
+        </p:txBody>
+      </p:sp>
+      <p:sp>
+        <p:nvSpPr>
+          <p:cNvPr id="3" name="Content Placeholder 2">
+            <a:extLst>
+              <a:ext uri="{FF2B5EF4-FFF2-40B4-BE49-F238E27FC236}">
+                <a16:creationId xmlns:a16="http://schemas.microsoft.com/office/drawing/2014/main" id="{4CE9425D-D1B8-8D7F-0747-EC206059C1F1}"/>
+              </a:ext>
+            </a:extLst>
+          </p:cNvPr>
+          <p:cNvSpPr>
+            <a:spLocks noGrp="1"/>
+          </p:cNvSpPr>
+          <p:nvPr>
+            <p:ph idx="1"/>
+          </p:nvPr>
+        </p:nvSpPr>
+        <p:spPr/>
+        <p:txBody>
+          <a:bodyPr/>
+          <a:lstStyle/>
+          <a:p>
+            <a:endParaRPr lang="en-IN"/>
+          </a:p>
+        </p:txBody>
+      </p:sp>
+    </p:spTree>
+    <p:extLst>
+      <p:ext uri="{BB962C8B-B14F-4D97-AF65-F5344CB8AC3E}">
+        <p14:creationId xmlns:p14="http://schemas.microsoft.com/office/powerpoint/2010/main" val="4141545334"/>
       </p:ext>
     </p:extLst>
   </p:cSld>

</xml_diff>